<commit_message>
Oct 1 2016 afternoon
</commit_message>
<xml_diff>
--- a/Cui_Brief.pptx
+++ b/Cui_Brief.pptx
@@ -645,6 +645,93 @@
           </a:p>
           <a:p>
             <a:pPr fontAlgn="ctr"/>
+            <a:r>
+              <a:rPr lang="en-US" sz="1200" b="0" i="0" kern="1200" dirty="0" smtClean="0">
+                <a:solidFill>
+                  <a:schemeClr val="tx1"/>
+                </a:solidFill>
+                <a:effectLst/>
+                <a:latin typeface="+mn-lt"/>
+                <a:ea typeface="+mn-ea"/>
+                <a:cs typeface="+mn-cs"/>
+              </a:rPr>
+              <a:t>In 2016,</a:t>
+            </a:r>
+            <a:r>
+              <a:rPr lang="en-US" sz="1200" b="0" i="0" kern="1200" baseline="0" dirty="0" smtClean="0">
+                <a:solidFill>
+                  <a:schemeClr val="tx1"/>
+                </a:solidFill>
+                <a:effectLst/>
+                <a:latin typeface="+mn-lt"/>
+                <a:ea typeface="+mn-ea"/>
+                <a:cs typeface="+mn-cs"/>
+              </a:rPr>
+              <a:t> Chinese yuan become fifth currency </a:t>
+            </a:r>
+            <a:r>
+              <a:rPr lang="en-US" sz="1200" kern="1200" dirty="0" smtClean="0">
+                <a:solidFill>
+                  <a:schemeClr val="tx1"/>
+                </a:solidFill>
+                <a:effectLst/>
+                <a:latin typeface="+mn-lt"/>
+                <a:ea typeface="+mn-ea"/>
+                <a:cs typeface="+mn-cs"/>
+              </a:rPr>
+              <a:t>along with the U.S. dollar, the euro, Japanese yen, and the British pound </a:t>
+            </a:r>
+          </a:p>
+          <a:p>
+            <a:pPr fontAlgn="ctr"/>
+            <a:r>
+              <a:rPr lang="en-US" sz="1200" b="0" i="0" kern="1200" baseline="0" dirty="0" smtClean="0">
+                <a:solidFill>
+                  <a:schemeClr val="tx1"/>
+                </a:solidFill>
+                <a:effectLst/>
+                <a:latin typeface="+mn-lt"/>
+                <a:ea typeface="+mn-ea"/>
+                <a:cs typeface="+mn-cs"/>
+              </a:rPr>
+              <a:t>in SDR basket </a:t>
+            </a:r>
+            <a:r>
+              <a:rPr lang="en-US" sz="1200" b="0" i="0" kern="1200" baseline="0" dirty="0" err="1" smtClean="0">
+                <a:solidFill>
+                  <a:schemeClr val="tx1"/>
+                </a:solidFill>
+                <a:effectLst/>
+                <a:latin typeface="+mn-lt"/>
+                <a:ea typeface="+mn-ea"/>
+                <a:cs typeface="+mn-cs"/>
+              </a:rPr>
+              <a:t>deterimined</a:t>
+            </a:r>
+            <a:r>
+              <a:rPr lang="en-US" sz="1200" b="0" i="0" kern="1200" baseline="0" dirty="0" smtClean="0">
+                <a:solidFill>
+                  <a:schemeClr val="tx1"/>
+                </a:solidFill>
+                <a:effectLst/>
+                <a:latin typeface="+mn-lt"/>
+                <a:ea typeface="+mn-ea"/>
+                <a:cs typeface="+mn-cs"/>
+              </a:rPr>
+              <a:t> by International </a:t>
+            </a:r>
+            <a:r>
+              <a:rPr lang="en-US" sz="1200" b="0" i="0" kern="1200" baseline="0" smtClean="0">
+                <a:solidFill>
+                  <a:schemeClr val="tx1"/>
+                </a:solidFill>
+                <a:effectLst/>
+                <a:latin typeface="+mn-lt"/>
+                <a:ea typeface="+mn-ea"/>
+                <a:cs typeface="+mn-cs"/>
+              </a:rPr>
+              <a:t>monetary fund (IMF)</a:t>
+            </a:r>
             <a:endParaRPr lang="en-US" sz="1200" b="0" i="0" kern="1200" dirty="0" smtClean="0">
               <a:solidFill>
                 <a:schemeClr val="tx1"/>
@@ -657,6 +744,18 @@
           </a:p>
           <a:p>
             <a:pPr fontAlgn="ctr"/>
+            <a:endParaRPr lang="en-US" sz="1200" b="0" i="0" kern="1200" dirty="0" smtClean="0">
+              <a:solidFill>
+                <a:schemeClr val="tx1"/>
+              </a:solidFill>
+              <a:effectLst/>
+              <a:latin typeface="+mn-lt"/>
+              <a:ea typeface="+mn-ea"/>
+              <a:cs typeface="+mn-cs"/>
+            </a:endParaRPr>
+          </a:p>
+          <a:p>
+            <a:pPr fontAlgn="ctr"/>
             <a:r>
               <a:rPr lang="en-US" sz="1200" b="0" i="0" kern="1200" dirty="0" smtClean="0">
                 <a:solidFill>
@@ -667,7 +766,19 @@
                 <a:ea typeface="+mn-ea"/>
                 <a:cs typeface="+mn-cs"/>
               </a:rPr>
-              <a:t>The Chinese Government faces numerous economic challenges including: (a) reducing its high domestic savings rate and correspondingly low domestic consumption; (b) facilitating higher-wage job opportunities for the aspiring middle class, including rural migrants and increasing numbers of college graduates; (c) reducing corruption and other economic crimes; and (d) containing environmental damage and social strife related to the economy's rapid transformation. Economic development has progressed further in coastal provinces than in the interior, and by 2014 more than 274 million migrant workers and their dependents had relocated to urban areas to find work. One consequence of population control policy is that China is now one of the most rapidly aging countries in the world. Deterioration in the environment - notably air pollution, soil erosion, and the steady fall of the water table, especially in the North - is another long-term problem. China continues to lose arable land because of erosion and economic development. The Chinese government is seeking to add energy production capacity from sources other than coal and oil, focusing on nuclear and alternative energy development.</a:t>
+              <a:t>The </a:t>
+            </a:r>
+            <a:r>
+              <a:rPr lang="en-US" sz="1200" b="0" i="0" kern="1200" dirty="0" smtClean="0">
+                <a:solidFill>
+                  <a:schemeClr val="tx1"/>
+                </a:solidFill>
+                <a:effectLst/>
+                <a:latin typeface="+mn-lt"/>
+                <a:ea typeface="+mn-ea"/>
+                <a:cs typeface="+mn-cs"/>
+              </a:rPr>
+              <a:t>Chinese Government faces numerous economic challenges including: (a) reducing its high domestic savings rate and correspondingly low domestic consumption; (b) facilitating higher-wage job opportunities for the aspiring middle class, including rural migrants and increasing numbers of college graduates; (c) reducing corruption and other economic crimes; and (d) containing environmental damage and social strife related to the economy's rapid transformation. Economic development has progressed further in coastal provinces than in the interior, and by 2014 more than 274 million migrant workers and their dependents had relocated to urban areas to find work. One consequence of population control policy is that China is now one of the most rapidly aging countries in the world. Deterioration in the environment - notably air pollution, soil erosion, and the steady fall of the water table, especially in the North - is another long-term problem. China continues to lose arable land because of erosion and economic development. The Chinese government is seeking to add energy production capacity from sources other than coal and oil, focusing on nuclear and alternative energy development.</a:t>
             </a:r>
           </a:p>
           <a:p>
@@ -8084,14 +8195,27 @@
             <p:ph type="subTitle" idx="1"/>
           </p:nvPr>
         </p:nvSpPr>
-        <p:spPr/>
+        <p:spPr>
+          <a:xfrm>
+            <a:off x="2438400" y="5715000"/>
+            <a:ext cx="5791200" cy="1219200"/>
+          </a:xfrm>
+        </p:spPr>
         <p:txBody>
           <a:bodyPr/>
           <a:lstStyle/>
           <a:p>
             <a:r>
               <a:rPr lang="en-US" dirty="0" smtClean="0"/>
-              <a:t>Wei Cui, Cadet Capt., USAF</a:t>
+              <a:t>Wei Cui, </a:t>
+            </a:r>
+            <a:r>
+              <a:rPr lang="en-US" dirty="0" smtClean="0"/>
+              <a:t>Cadet, </a:t>
+            </a:r>
+            <a:r>
+              <a:rPr lang="en-US" dirty="0" smtClean="0"/>
+              <a:t>USAF</a:t>
             </a:r>
             <a:endParaRPr lang="en-US" dirty="0"/>
           </a:p>
@@ -8123,43 +8247,6 @@
               <a:t>China</a:t>
             </a:r>
             <a:endParaRPr lang="en-US" dirty="0"/>
-          </a:p>
-        </p:txBody>
-      </p:sp>
-      <p:sp>
-        <p:nvSpPr>
-          <p:cNvPr id="2061" name="Text Box 13"/>
-          <p:cNvSpPr txBox="1">
-            <a:spLocks noChangeArrowheads="1"/>
-          </p:cNvSpPr>
-          <p:nvPr/>
-        </p:nvSpPr>
-        <p:spPr bwMode="auto">
-          <a:xfrm>
-            <a:off x="1066800" y="5867400"/>
-            <a:ext cx="6721475" cy="641350"/>
-          </a:xfrm>
-          <a:prstGeom prst="rect">
-            <a:avLst/>
-          </a:prstGeom>
-          <a:noFill/>
-          <a:ln w="9525">
-            <a:noFill/>
-            <a:miter lim="800000"/>
-            <a:headEnd/>
-            <a:tailEnd/>
-          </a:ln>
-          <a:effectLst/>
-        </p:spPr>
-        <p:txBody>
-          <a:bodyPr>
-            <a:spAutoFit/>
-          </a:bodyPr>
-          <a:lstStyle/>
-          <a:p>
-            <a:endParaRPr lang="en-US" sz="3600">
-              <a:latin typeface="Bookman Old Style" pitchFamily="18" charset="0"/>
-            </a:endParaRPr>
           </a:p>
         </p:txBody>
       </p:sp>
@@ -8269,11 +8356,7 @@
             </a:r>
             <a:r>
               <a:rPr lang="en-US" sz="2000" dirty="0" smtClean="0"/>
-              <a:t>(Santa Barbara, CA: </a:t>
-            </a:r>
-            <a:r>
-              <a:rPr lang="en-US" sz="2000" dirty="0" smtClean="0"/>
-              <a:t>University </a:t>
+              <a:t>(Santa Barbara, CA: University </a:t>
             </a:r>
             <a:r>
               <a:rPr lang="en-US" sz="2000" dirty="0"/>
@@ -8281,11 +8364,7 @@
             </a:r>
             <a:r>
               <a:rPr lang="en-US" sz="2000" dirty="0" smtClean="0"/>
-              <a:t>Press, 1989</a:t>
-            </a:r>
-            <a:r>
-              <a:rPr lang="en-US" sz="2000" dirty="0" smtClean="0"/>
-              <a:t>), 2</a:t>
+              <a:t>Press, 1989), 2</a:t>
             </a:r>
             <a:r>
               <a:rPr lang="en-US" sz="2000" dirty="0"/>
@@ -8340,11 +8419,7 @@
             </a:r>
             <a:r>
               <a:rPr lang="en-US" sz="2000" dirty="0" smtClean="0"/>
-              <a:t>/geos/ch.html </a:t>
-            </a:r>
-            <a:r>
-              <a:rPr lang="en-US" sz="2000" dirty="0" smtClean="0"/>
-              <a:t>(accessed 30 Sep 2016).</a:t>
+              <a:t>/geos/ch.html (accessed 30 Sep 2016).</a:t>
             </a:r>
           </a:p>
           <a:p>
@@ -10674,6 +10749,30 @@
               <a:buChar char="v"/>
             </a:pPr>
             <a:r>
+              <a:rPr lang="en-US" b="1" dirty="0">
+                <a:effectLst>
+                  <a:outerShdw blurRad="38100" dist="38100" dir="2700000" algn="tl">
+                    <a:srgbClr val="000000">
+                      <a:alpha val="43137"/>
+                    </a:srgbClr>
+                  </a:outerShdw>
+                </a:effectLst>
+                <a:latin typeface="Times New Roman" panose="02020603050405020304" pitchFamily="18" charset="0"/>
+                <a:cs typeface="Times New Roman" panose="02020603050405020304" pitchFamily="18" charset="0"/>
+              </a:rPr>
+              <a:t>Economy</a:t>
+            </a:r>
+          </a:p>
+          <a:p>
+            <a:pPr marL="465138" indent="-465138" eaLnBrk="1" hangingPunct="1">
+              <a:lnSpc>
+                <a:spcPct val="125000"/>
+              </a:lnSpc>
+              <a:buSzPct val="75000"/>
+              <a:buFont typeface="Wingdings" pitchFamily="2" charset="2"/>
+              <a:buChar char="v"/>
+            </a:pPr>
+            <a:r>
               <a:rPr lang="en-US" b="1" dirty="0" smtClean="0">
                 <a:effectLst>
                   <a:outerShdw blurRad="38100" dist="38100" dir="2700000" algn="tl">
@@ -10687,30 +10786,17 @@
               </a:rPr>
               <a:t>Language</a:t>
             </a:r>
-          </a:p>
-          <a:p>
-            <a:pPr marL="465138" indent="-465138" eaLnBrk="1" hangingPunct="1">
-              <a:lnSpc>
-                <a:spcPct val="125000"/>
-              </a:lnSpc>
-              <a:buSzPct val="75000"/>
-              <a:buFont typeface="Wingdings" pitchFamily="2" charset="2"/>
-              <a:buChar char="v"/>
-            </a:pPr>
-            <a:r>
-              <a:rPr lang="en-US" sz="3200" b="1" dirty="0" smtClean="0">
-                <a:effectLst>
-                  <a:outerShdw blurRad="38100" dist="38100" dir="2700000" algn="tl">
-                    <a:srgbClr val="000000">
-                      <a:alpha val="43137"/>
-                    </a:srgbClr>
-                  </a:outerShdw>
-                </a:effectLst>
-                <a:latin typeface="Times New Roman" panose="02020603050405020304" pitchFamily="18" charset="0"/>
-                <a:cs typeface="Times New Roman" panose="02020603050405020304" pitchFamily="18" charset="0"/>
-              </a:rPr>
-              <a:t>Economy</a:t>
-            </a:r>
+            <a:endParaRPr lang="en-US" b="1" dirty="0" smtClean="0">
+              <a:effectLst>
+                <a:outerShdw blurRad="38100" dist="38100" dir="2700000" algn="tl">
+                  <a:srgbClr val="000000">
+                    <a:alpha val="43137"/>
+                  </a:srgbClr>
+                </a:outerShdw>
+              </a:effectLst>
+              <a:latin typeface="Times New Roman" panose="02020603050405020304" pitchFamily="18" charset="0"/>
+              <a:cs typeface="Times New Roman" panose="02020603050405020304" pitchFamily="18" charset="0"/>
+            </a:endParaRPr>
           </a:p>
           <a:p>
             <a:pPr marL="465138" indent="-465138" eaLnBrk="1" hangingPunct="1">
@@ -10733,7 +10819,21 @@
                 <a:latin typeface="Times New Roman" panose="02020603050405020304" pitchFamily="18" charset="0"/>
                 <a:cs typeface="Times New Roman" panose="02020603050405020304" pitchFamily="18" charset="0"/>
               </a:rPr>
-              <a:t>US Interests in China</a:t>
+              <a:t>US </a:t>
+            </a:r>
+            <a:r>
+              <a:rPr lang="en-US" b="1" dirty="0" smtClean="0">
+                <a:effectLst>
+                  <a:outerShdw blurRad="38100" dist="38100" dir="2700000" algn="tl">
+                    <a:srgbClr val="000000">
+                      <a:alpha val="43137"/>
+                    </a:srgbClr>
+                  </a:outerShdw>
+                </a:effectLst>
+                <a:latin typeface="Times New Roman" panose="02020603050405020304" pitchFamily="18" charset="0"/>
+                <a:cs typeface="Times New Roman" panose="02020603050405020304" pitchFamily="18" charset="0"/>
+              </a:rPr>
+              <a:t>Interests in China</a:t>
             </a:r>
           </a:p>
           <a:p>
@@ -13338,20 +13438,6 @@
               </a:rPr>
               <a:t>Language</a:t>
             </a:r>
-            <a:endParaRPr lang="en-US" b="1" dirty="0" smtClean="0">
-              <a:solidFill>
-                <a:srgbClr val="E1E1DF"/>
-              </a:solidFill>
-              <a:effectLst>
-                <a:outerShdw blurRad="38100" dist="38100" dir="2700000" algn="tl">
-                  <a:srgbClr val="000000">
-                    <a:alpha val="43137"/>
-                  </a:srgbClr>
-                </a:outerShdw>
-              </a:effectLst>
-              <a:latin typeface="Times New Roman" panose="02020603050405020304" pitchFamily="18" charset="0"/>
-              <a:cs typeface="Times New Roman" panose="02020603050405020304" pitchFamily="18" charset="0"/>
-            </a:endParaRPr>
           </a:p>
           <a:p>
             <a:pPr marL="465138" indent="-465138" eaLnBrk="1" hangingPunct="1">
@@ -13377,24 +13463,7 @@
                 <a:latin typeface="Times New Roman" panose="02020603050405020304" pitchFamily="18" charset="0"/>
                 <a:cs typeface="Times New Roman" panose="02020603050405020304" pitchFamily="18" charset="0"/>
               </a:rPr>
-              <a:t>US </a:t>
-            </a:r>
-            <a:r>
-              <a:rPr lang="en-US" b="1" dirty="0" smtClean="0">
-                <a:solidFill>
-                  <a:srgbClr val="E1E1DF"/>
-                </a:solidFill>
-                <a:effectLst>
-                  <a:outerShdw blurRad="38100" dist="38100" dir="2700000" algn="tl">
-                    <a:srgbClr val="000000">
-                      <a:alpha val="43137"/>
-                    </a:srgbClr>
-                  </a:outerShdw>
-                </a:effectLst>
-                <a:latin typeface="Times New Roman" panose="02020603050405020304" pitchFamily="18" charset="0"/>
-                <a:cs typeface="Times New Roman" panose="02020603050405020304" pitchFamily="18" charset="0"/>
-              </a:rPr>
-              <a:t>Interests in China</a:t>
+              <a:t>US Interests in China</a:t>
             </a:r>
           </a:p>
           <a:p>
@@ -15529,7 +15598,7 @@
         <p:spPr>
           <a:xfrm>
             <a:off x="914400" y="1600200"/>
-            <a:ext cx="7620000" cy="5029200"/>
+            <a:ext cx="8229600" cy="5029200"/>
           </a:xfrm>
         </p:spPr>
         <p:txBody>
@@ -15572,11 +15641,7 @@
             </a:pPr>
             <a:r>
               <a:rPr lang="en-US" sz="2400" dirty="0" smtClean="0"/>
-              <a:t>In 2014, China has the second largest economy in the world</a:t>
-            </a:r>
-            <a:r>
-              <a:rPr lang="en-US" sz="2400" dirty="0" smtClean="0"/>
-              <a:t>.</a:t>
+              <a:t>In 2014, China has the second largest economy in the world.</a:t>
             </a:r>
           </a:p>
           <a:p>
@@ -15590,11 +15655,19 @@
             </a:pPr>
             <a:r>
               <a:rPr lang="en-US" sz="2400" dirty="0" smtClean="0"/>
-              <a:t>In 2016, Chinese yuan becomes the fifth currency in SDR </a:t>
-            </a:r>
-            <a:r>
-              <a:rPr lang="en-US" sz="2400" smtClean="0"/>
-              <a:t>basket determined by IMF.</a:t>
+              <a:t>In 2016, Chinese yuan becomes the fifth currency in </a:t>
+            </a:r>
+            <a:r>
+              <a:rPr lang="en-US" sz="2400" dirty="0"/>
+              <a:t>Special Drawing Right </a:t>
+            </a:r>
+            <a:r>
+              <a:rPr lang="en-US" sz="2400" dirty="0" smtClean="0"/>
+              <a:t>(</a:t>
+            </a:r>
+            <a:r>
+              <a:rPr lang="en-US" sz="2400" dirty="0" smtClean="0"/>
+              <a:t>SDR) basket.</a:t>
             </a:r>
             <a:endParaRPr lang="en-US" sz="2400" dirty="0" smtClean="0"/>
           </a:p>
@@ -15607,20 +15680,13 @@
               <a:buFont typeface="Wingdings" pitchFamily="2" charset="2"/>
               <a:buChar char="v"/>
             </a:pPr>
-            <a:endParaRPr lang="en-US" sz="2800" dirty="0"/>
-          </a:p>
-          <a:p>
-            <a:pPr marL="465138" indent="-465138" eaLnBrk="1" hangingPunct="1">
-              <a:lnSpc>
-                <a:spcPct val="125000"/>
-              </a:lnSpc>
-              <a:buSzPct val="75000"/>
-              <a:buFont typeface="Wingdings" pitchFamily="2" charset="2"/>
-              <a:buChar char="v"/>
-            </a:pPr>
             <a:r>
               <a:rPr lang="en-US" sz="2800" dirty="0" smtClean="0"/>
-              <a:t>Recent economic challenges</a:t>
+              <a:t>Recent </a:t>
+            </a:r>
+            <a:r>
+              <a:rPr lang="en-US" sz="2800" dirty="0" smtClean="0"/>
+              <a:t>economic challenges</a:t>
             </a:r>
           </a:p>
           <a:p>
@@ -15634,8 +15700,17 @@
             </a:pPr>
             <a:r>
               <a:rPr lang="en-US" sz="2400" dirty="0" smtClean="0"/>
-              <a:t>High domestic saving rate</a:t>
-            </a:r>
+              <a:t>High </a:t>
+            </a:r>
+            <a:r>
+              <a:rPr lang="en-US" sz="2400" dirty="0" smtClean="0"/>
+              <a:t>housing price and low </a:t>
+            </a:r>
+            <a:r>
+              <a:rPr lang="en-US" sz="2400" smtClean="0"/>
+              <a:t>domestic consumption</a:t>
+            </a:r>
+            <a:endParaRPr lang="en-US" sz="2400" dirty="0" smtClean="0"/>
           </a:p>
           <a:p>
             <a:pPr marL="865188" lvl="1" indent="-465138" eaLnBrk="1" hangingPunct="1">
@@ -15945,24 +16020,7 @@
                 <a:latin typeface="Times New Roman" panose="02020603050405020304" pitchFamily="18" charset="0"/>
                 <a:cs typeface="Times New Roman" panose="02020603050405020304" pitchFamily="18" charset="0"/>
               </a:rPr>
-              <a:t>US </a:t>
-            </a:r>
-            <a:r>
-              <a:rPr lang="en-US" b="1" dirty="0" smtClean="0">
-                <a:solidFill>
-                  <a:srgbClr val="E1E1DF"/>
-                </a:solidFill>
-                <a:effectLst>
-                  <a:outerShdw blurRad="38100" dist="38100" dir="2700000" algn="tl">
-                    <a:srgbClr val="000000">
-                      <a:alpha val="43137"/>
-                    </a:srgbClr>
-                  </a:outerShdw>
-                </a:effectLst>
-                <a:latin typeface="Times New Roman" panose="02020603050405020304" pitchFamily="18" charset="0"/>
-                <a:cs typeface="Times New Roman" panose="02020603050405020304" pitchFamily="18" charset="0"/>
-              </a:rPr>
-              <a:t>Interests in China</a:t>
+              <a:t>US Interests in China</a:t>
             </a:r>
           </a:p>
           <a:p>
@@ -16425,20 +16483,6 @@
               </a:rPr>
               <a:t>Language</a:t>
             </a:r>
-            <a:endParaRPr lang="en-US" b="1" dirty="0" smtClean="0">
-              <a:solidFill>
-                <a:srgbClr val="E1E1DF"/>
-              </a:solidFill>
-              <a:effectLst>
-                <a:outerShdw blurRad="38100" dist="38100" dir="2700000" algn="tl">
-                  <a:srgbClr val="000000">
-                    <a:alpha val="43137"/>
-                  </a:srgbClr>
-                </a:outerShdw>
-              </a:effectLst>
-              <a:latin typeface="Times New Roman" panose="02020603050405020304" pitchFamily="18" charset="0"/>
-              <a:cs typeface="Times New Roman" panose="02020603050405020304" pitchFamily="18" charset="0"/>
-            </a:endParaRPr>
           </a:p>
           <a:p>
             <a:pPr marL="465138" indent="-465138" eaLnBrk="1" hangingPunct="1">
@@ -16461,21 +16505,7 @@
                 <a:latin typeface="Times New Roman" panose="02020603050405020304" pitchFamily="18" charset="0"/>
                 <a:cs typeface="Times New Roman" panose="02020603050405020304" pitchFamily="18" charset="0"/>
               </a:rPr>
-              <a:t>US </a:t>
-            </a:r>
-            <a:r>
-              <a:rPr lang="en-US" b="1" dirty="0" smtClean="0">
-                <a:effectLst>
-                  <a:outerShdw blurRad="38100" dist="38100" dir="2700000" algn="tl">
-                    <a:srgbClr val="000000">
-                      <a:alpha val="43137"/>
-                    </a:srgbClr>
-                  </a:outerShdw>
-                </a:effectLst>
-                <a:latin typeface="Times New Roman" panose="02020603050405020304" pitchFamily="18" charset="0"/>
-                <a:cs typeface="Times New Roman" panose="02020603050405020304" pitchFamily="18" charset="0"/>
-              </a:rPr>
-              <a:t>Interests in China</a:t>
+              <a:t>US Interests in China</a:t>
             </a:r>
           </a:p>
           <a:p>
@@ -16873,17 +16903,6 @@
               </a:rPr>
               <a:t>Language</a:t>
             </a:r>
-            <a:endParaRPr lang="en-US" b="1" dirty="0" smtClean="0">
-              <a:effectLst>
-                <a:outerShdw blurRad="38100" dist="38100" dir="2700000" algn="tl">
-                  <a:srgbClr val="000000">
-                    <a:alpha val="43137"/>
-                  </a:srgbClr>
-                </a:outerShdw>
-              </a:effectLst>
-              <a:latin typeface="Times New Roman" panose="02020603050405020304" pitchFamily="18" charset="0"/>
-              <a:cs typeface="Times New Roman" panose="02020603050405020304" pitchFamily="18" charset="0"/>
-            </a:endParaRPr>
           </a:p>
           <a:p>
             <a:pPr marL="465138" indent="-465138" eaLnBrk="1" hangingPunct="1">
@@ -16906,21 +16925,7 @@
                 <a:latin typeface="Times New Roman" panose="02020603050405020304" pitchFamily="18" charset="0"/>
                 <a:cs typeface="Times New Roman" panose="02020603050405020304" pitchFamily="18" charset="0"/>
               </a:rPr>
-              <a:t>US </a:t>
-            </a:r>
-            <a:r>
-              <a:rPr lang="en-US" b="1" dirty="0" smtClean="0">
-                <a:effectLst>
-                  <a:outerShdw blurRad="38100" dist="38100" dir="2700000" algn="tl">
-                    <a:srgbClr val="000000">
-                      <a:alpha val="43137"/>
-                    </a:srgbClr>
-                  </a:outerShdw>
-                </a:effectLst>
-                <a:latin typeface="Times New Roman" panose="02020603050405020304" pitchFamily="18" charset="0"/>
-                <a:cs typeface="Times New Roman" panose="02020603050405020304" pitchFamily="18" charset="0"/>
-              </a:rPr>
-              <a:t>Interests in China</a:t>
+              <a:t>US Interests in China</a:t>
             </a:r>
           </a:p>
           <a:p>

</xml_diff>